<commit_message>
Alteracao dos Slides e exercícios
</commit_message>
<xml_diff>
--- a/Aula 2/Aula 02.pptx
+++ b/Aula 2/Aula 02.pptx
@@ -38,37 +38,38 @@
     <p:sldId id="286" r:id="rId36"/>
     <p:sldId id="287" r:id="rId37"/>
     <p:sldId id="288" r:id="rId38"/>
+    <p:sldId id="289" r:id="rId39"/>
   </p:sldIdLst>
   <p:sldSz cx="18288000" cy="10287000"/>
   <p:notesSz cx="6858000" cy="9144000"/>
   <p:embeddedFontLst>
     <p:embeddedFont>
       <p:font typeface="League Spartan" charset="1" panose="00000800000000000000"/>
-      <p:regular r:id="rId39"/>
+      <p:regular r:id="rId40"/>
     </p:embeddedFont>
     <p:embeddedFont>
       <p:font typeface="Fredoka" charset="1" panose="02000000000000000000"/>
-      <p:regular r:id="rId40"/>
+      <p:regular r:id="rId41"/>
     </p:embeddedFont>
     <p:embeddedFont>
       <p:font typeface="Arial" charset="1" panose="020B0502020202020204"/>
-      <p:regular r:id="rId41"/>
+      <p:regular r:id="rId42"/>
     </p:embeddedFont>
     <p:embeddedFont>
       <p:font typeface="Open Sans Bold" charset="1" panose="020B0806030504020204"/>
-      <p:regular r:id="rId42"/>
+      <p:regular r:id="rId43"/>
     </p:embeddedFont>
     <p:embeddedFont>
       <p:font typeface="Open Sans" charset="1" panose="020B0606030504020204"/>
-      <p:regular r:id="rId43"/>
+      <p:regular r:id="rId44"/>
     </p:embeddedFont>
     <p:embeddedFont>
       <p:font typeface="Arial Bold" charset="1" panose="020B0802020202020204"/>
-      <p:regular r:id="rId44"/>
+      <p:regular r:id="rId45"/>
     </p:embeddedFont>
     <p:embeddedFont>
       <p:font typeface="Arimo" charset="1" panose="020B0604020202020204"/>
-      <p:regular r:id="rId45"/>
+      <p:regular r:id="rId46"/>
     </p:embeddedFont>
   </p:embeddedFontLst>
   <p:defaultTextStyle>
@@ -9619,6 +9620,131 @@
 </file>
 
 <file path=ppt/slides/slide33.xml><?xml version="1.0" encoding="utf-8"?>
+<p:sld xmlns:p="http://schemas.openxmlformats.org/presentationml/2006/main" xmlns:a="http://schemas.openxmlformats.org/drawingml/2006/main" xmlns:r="http://schemas.openxmlformats.org/officeDocument/2006/relationships">
+  <p:cSld>
+    <p:bg>
+      <p:bgPr>
+        <a:solidFill>
+          <a:srgbClr val="284C6A"/>
+        </a:solidFill>
+      </p:bgPr>
+    </p:bg>
+    <p:spTree>
+      <p:nvGrpSpPr>
+        <p:cNvPr id="1" name=""/>
+        <p:cNvGrpSpPr/>
+        <p:nvPr/>
+      </p:nvGrpSpPr>
+      <p:grpSpPr>
+        <a:xfrm>
+          <a:off x="0" y="0"/>
+          <a:ext cx="0" cy="0"/>
+          <a:chOff x="0" y="0"/>
+          <a:chExt cx="0" cy="0"/>
+        </a:xfrm>
+      </p:grpSpPr>
+      <p:sp>
+        <p:nvSpPr>
+          <p:cNvPr name="TextBox 2" id="2"/>
+          <p:cNvSpPr txBox="true"/>
+          <p:nvPr/>
+        </p:nvSpPr>
+        <p:spPr>
+          <a:xfrm rot="0">
+            <a:off x="4406479" y="4204449"/>
+            <a:ext cx="7561613" cy="1698626"/>
+          </a:xfrm>
+          <a:prstGeom prst="rect">
+            <a:avLst/>
+          </a:prstGeom>
+        </p:spPr>
+        <p:txBody>
+          <a:bodyPr anchor="t" rtlCol="false" tIns="0" lIns="0" bIns="0" rIns="0">
+            <a:spAutoFit/>
+          </a:bodyPr>
+          <a:lstStyle/>
+          <a:p>
+            <a:pPr algn="ctr">
+              <a:lnSpc>
+                <a:spcPts val="13999"/>
+              </a:lnSpc>
+            </a:pPr>
+            <a:r>
+              <a:rPr lang="en-US" sz="9999">
+                <a:solidFill>
+                  <a:srgbClr val="FFFFFF"/>
+                </a:solidFill>
+                <a:latin typeface="Fredoka"/>
+                <a:ea typeface="Fredoka"/>
+                <a:cs typeface="Fredoka"/>
+                <a:sym typeface="Fredoka"/>
+              </a:rPr>
+              <a:t>EXERCÍCIOS</a:t>
+            </a:r>
+          </a:p>
+        </p:txBody>
+      </p:sp>
+      <p:sp>
+        <p:nvSpPr>
+          <p:cNvPr name="Freeform 3" id="3"/>
+          <p:cNvSpPr/>
+          <p:nvPr/>
+        </p:nvSpPr>
+        <p:spPr>
+          <a:xfrm flipH="false" flipV="false" rot="0">
+            <a:off x="12354040" y="4383926"/>
+            <a:ext cx="1527480" cy="1519148"/>
+          </a:xfrm>
+          <a:custGeom>
+            <a:avLst/>
+            <a:gdLst/>
+            <a:ahLst/>
+            <a:cxnLst/>
+            <a:rect r="r" b="b" t="t" l="l"/>
+            <a:pathLst>
+              <a:path h="1519148" w="1527480">
+                <a:moveTo>
+                  <a:pt x="0" y="0"/>
+                </a:moveTo>
+                <a:lnTo>
+                  <a:pt x="1527481" y="0"/>
+                </a:lnTo>
+                <a:lnTo>
+                  <a:pt x="1527481" y="1519148"/>
+                </a:lnTo>
+                <a:lnTo>
+                  <a:pt x="0" y="1519148"/>
+                </a:lnTo>
+                <a:lnTo>
+                  <a:pt x="0" y="0"/>
+                </a:lnTo>
+                <a:close/>
+              </a:path>
+            </a:pathLst>
+          </a:custGeom>
+          <a:blipFill>
+            <a:blip r:embed="rId2">
+              <a:extLst>
+                <a:ext uri="{96DAC541-7B7A-43D3-8B79-37D633B846F1}">
+                  <asvg:svgBlip xmlns:asvg="http://schemas.microsoft.com/office/drawing/2016/SVG/main" r:embed="rId3"/>
+                </a:ext>
+              </a:extLst>
+            </a:blip>
+            <a:stretch>
+              <a:fillRect l="0" t="0" r="0" b="0"/>
+            </a:stretch>
+          </a:blipFill>
+        </p:spPr>
+      </p:sp>
+    </p:spTree>
+  </p:cSld>
+  <p:clrMapOvr>
+    <a:masterClrMapping/>
+  </p:clrMapOvr>
+</p:sld>
+</file>
+
+<file path=ppt/slides/slide34.xml><?xml version="1.0" encoding="utf-8"?>
 <p:sld xmlns:p="http://schemas.openxmlformats.org/presentationml/2006/main" xmlns:a="http://schemas.openxmlformats.org/drawingml/2006/main" xmlns:r="http://schemas.openxmlformats.org/officeDocument/2006/relationships">
   <p:cSld>
     <p:bg>

</xml_diff>